<commit_message>
Added some html module topics
</commit_message>
<xml_diff>
--- a/COURSE-CURRICULUM.pptx
+++ b/COURSE-CURRICULUM.pptx
@@ -266,7 +266,7 @@
           <a:p>
             <a:fld id="{52084101-256F-334F-8B5B-A96E81A8D347}" type="datetimeFigureOut">
               <a:rPr lang="en-US" smtClean="0"/>
-              <a:t>7/17/23</a:t>
+              <a:t>7/29/23</a:t>
             </a:fld>
             <a:endParaRPr lang="en-US"/>
           </a:p>
@@ -464,7 +464,7 @@
           <a:p>
             <a:fld id="{52084101-256F-334F-8B5B-A96E81A8D347}" type="datetimeFigureOut">
               <a:rPr lang="en-US" smtClean="0"/>
-              <a:t>7/17/23</a:t>
+              <a:t>7/29/23</a:t>
             </a:fld>
             <a:endParaRPr lang="en-US"/>
           </a:p>
@@ -672,7 +672,7 @@
           <a:p>
             <a:fld id="{52084101-256F-334F-8B5B-A96E81A8D347}" type="datetimeFigureOut">
               <a:rPr lang="en-US" smtClean="0"/>
-              <a:t>7/17/23</a:t>
+              <a:t>7/29/23</a:t>
             </a:fld>
             <a:endParaRPr lang="en-US"/>
           </a:p>
@@ -870,7 +870,7 @@
           <a:p>
             <a:fld id="{52084101-256F-334F-8B5B-A96E81A8D347}" type="datetimeFigureOut">
               <a:rPr lang="en-US" smtClean="0"/>
-              <a:t>7/17/23</a:t>
+              <a:t>7/29/23</a:t>
             </a:fld>
             <a:endParaRPr lang="en-US"/>
           </a:p>
@@ -1145,7 +1145,7 @@
           <a:p>
             <a:fld id="{52084101-256F-334F-8B5B-A96E81A8D347}" type="datetimeFigureOut">
               <a:rPr lang="en-US" smtClean="0"/>
-              <a:t>7/17/23</a:t>
+              <a:t>7/29/23</a:t>
             </a:fld>
             <a:endParaRPr lang="en-US"/>
           </a:p>
@@ -1410,7 +1410,7 @@
           <a:p>
             <a:fld id="{52084101-256F-334F-8B5B-A96E81A8D347}" type="datetimeFigureOut">
               <a:rPr lang="en-US" smtClean="0"/>
-              <a:t>7/17/23</a:t>
+              <a:t>7/29/23</a:t>
             </a:fld>
             <a:endParaRPr lang="en-US"/>
           </a:p>
@@ -1822,7 +1822,7 @@
           <a:p>
             <a:fld id="{52084101-256F-334F-8B5B-A96E81A8D347}" type="datetimeFigureOut">
               <a:rPr lang="en-US" smtClean="0"/>
-              <a:t>7/17/23</a:t>
+              <a:t>7/29/23</a:t>
             </a:fld>
             <a:endParaRPr lang="en-US"/>
           </a:p>
@@ -1963,7 +1963,7 @@
           <a:p>
             <a:fld id="{52084101-256F-334F-8B5B-A96E81A8D347}" type="datetimeFigureOut">
               <a:rPr lang="en-US" smtClean="0"/>
-              <a:t>7/17/23</a:t>
+              <a:t>7/29/23</a:t>
             </a:fld>
             <a:endParaRPr lang="en-US"/>
           </a:p>
@@ -2076,7 +2076,7 @@
           <a:p>
             <a:fld id="{52084101-256F-334F-8B5B-A96E81A8D347}" type="datetimeFigureOut">
               <a:rPr lang="en-US" smtClean="0"/>
-              <a:t>7/17/23</a:t>
+              <a:t>7/29/23</a:t>
             </a:fld>
             <a:endParaRPr lang="en-US"/>
           </a:p>
@@ -2387,7 +2387,7 @@
           <a:p>
             <a:fld id="{52084101-256F-334F-8B5B-A96E81A8D347}" type="datetimeFigureOut">
               <a:rPr lang="en-US" smtClean="0"/>
-              <a:t>7/17/23</a:t>
+              <a:t>7/29/23</a:t>
             </a:fld>
             <a:endParaRPr lang="en-US"/>
           </a:p>
@@ -2675,7 +2675,7 @@
           <a:p>
             <a:fld id="{52084101-256F-334F-8B5B-A96E81A8D347}" type="datetimeFigureOut">
               <a:rPr lang="en-US" smtClean="0"/>
-              <a:t>7/17/23</a:t>
+              <a:t>7/29/23</a:t>
             </a:fld>
             <a:endParaRPr lang="en-US"/>
           </a:p>
@@ -2916,7 +2916,7 @@
           <a:p>
             <a:fld id="{52084101-256F-334F-8B5B-A96E81A8D347}" type="datetimeFigureOut">
               <a:rPr lang="en-US" smtClean="0"/>
-              <a:t>7/17/23</a:t>
+              <a:t>7/29/23</a:t>
             </a:fld>
             <a:endParaRPr lang="en-US"/>
           </a:p>
@@ -3636,7 +3636,7 @@
         <p:spPr>
           <a:xfrm>
             <a:off x="678094" y="2476071"/>
-            <a:ext cx="8669106" cy="3539430"/>
+            <a:ext cx="8669106" cy="4339650"/>
           </a:xfrm>
           <a:prstGeom prst="rect">
             <a:avLst/>
@@ -3691,7 +3691,7 @@
                 <a:effectLst/>
                 <a:latin typeface="Arial" panose="020B0604020202020204" pitchFamily="34" charset="0"/>
               </a:rPr>
-              <a:t>HTML Text Formatting</a:t>
+              <a:t>HTML Text Formatting Tags</a:t>
             </a:r>
           </a:p>
           <a:p>
@@ -3725,6 +3725,28 @@
               </a:rPr>
               <a:t>HTML Links</a:t>
             </a:r>
+          </a:p>
+          <a:p>
+            <a:pPr marL="342900" indent="-342900">
+              <a:buFont typeface="Arial" panose="020B0604020202020204" pitchFamily="34" charset="0"/>
+              <a:buChar char="•"/>
+            </a:pPr>
+            <a:r>
+              <a:rPr lang="en-US" dirty="0">
+                <a:solidFill>
+                  <a:srgbClr val="000000"/>
+                </a:solidFill>
+                <a:latin typeface="Arial" panose="020B0604020202020204" pitchFamily="34" charset="0"/>
+              </a:rPr>
+              <a:t>HTML Attributes</a:t>
+            </a:r>
+            <a:endParaRPr lang="en-US" sz="1800" b="0" i="0" u="none" strike="noStrike" dirty="0">
+              <a:solidFill>
+                <a:srgbClr val="000000"/>
+              </a:solidFill>
+              <a:effectLst/>
+              <a:latin typeface="Arial" panose="020B0604020202020204" pitchFamily="34" charset="0"/>
+            </a:endParaRPr>
           </a:p>
           <a:p>
             <a:pPr marL="342900" indent="-342900">
@@ -3779,28 +3801,59 @@
               </a:rPr>
               <a:t>HTML Forms</a:t>
             </a:r>
-            <a:endParaRPr lang="en-US" dirty="0">
+          </a:p>
+          <a:p>
+            <a:pPr marL="342900" indent="-342900">
+              <a:buFont typeface="Arial" panose="020B0604020202020204" pitchFamily="34" charset="0"/>
+              <a:buChar char="•"/>
+            </a:pPr>
+            <a:r>
+              <a:rPr lang="en-US" dirty="0">
+                <a:solidFill>
+                  <a:srgbClr val="000000"/>
+                </a:solidFill>
+                <a:latin typeface="Arial" panose="020B0604020202020204" pitchFamily="34" charset="0"/>
+              </a:rPr>
+              <a:t>HTML Favicon</a:t>
+            </a:r>
+          </a:p>
+          <a:p>
+            <a:pPr marL="342900" indent="-342900">
+              <a:buFont typeface="Arial" panose="020B0604020202020204" pitchFamily="34" charset="0"/>
+              <a:buChar char="•"/>
+            </a:pPr>
+            <a:r>
+              <a:rPr lang="en-US" sz="1800" b="0" i="0" u="none" strike="noStrike" dirty="0">
+                <a:solidFill>
+                  <a:srgbClr val="000000"/>
+                </a:solidFill>
+                <a:effectLst/>
+                <a:latin typeface="Arial" panose="020B0604020202020204" pitchFamily="34" charset="0"/>
+              </a:rPr>
+              <a:t>HTML Semantic Elements</a:t>
+            </a:r>
+          </a:p>
+          <a:p>
+            <a:pPr marL="342900" indent="-342900">
+              <a:buFont typeface="Arial" panose="020B0604020202020204" pitchFamily="34" charset="0"/>
+              <a:buChar char="•"/>
+            </a:pPr>
+            <a:r>
+              <a:rPr lang="en-US" dirty="0">
+                <a:solidFill>
+                  <a:srgbClr val="000000"/>
+                </a:solidFill>
+                <a:latin typeface="Arial" panose="020B0604020202020204" pitchFamily="34" charset="0"/>
+              </a:rPr>
+              <a:t>HTML Block and Inline Elements</a:t>
+            </a:r>
+            <a:endParaRPr lang="en-US" sz="1800" b="0" i="0" u="none" strike="noStrike" dirty="0">
               <a:solidFill>
                 <a:srgbClr val="000000"/>
               </a:solidFill>
+              <a:effectLst/>
               <a:latin typeface="Arial" panose="020B0604020202020204" pitchFamily="34" charset="0"/>
             </a:endParaRPr>
-          </a:p>
-          <a:p>
-            <a:pPr marL="342900" indent="-342900">
-              <a:buFont typeface="Arial" panose="020B0604020202020204" pitchFamily="34" charset="0"/>
-              <a:buChar char="•"/>
-            </a:pPr>
-            <a:r>
-              <a:rPr lang="en-US" sz="1800" b="0" i="0" u="none" strike="noStrike" dirty="0">
-                <a:solidFill>
-                  <a:srgbClr val="000000"/>
-                </a:solidFill>
-                <a:effectLst/>
-                <a:latin typeface="Arial" panose="020B0604020202020204" pitchFamily="34" charset="0"/>
-              </a:rPr>
-              <a:t>HTML Semantic Elements</a:t>
-            </a:r>
           </a:p>
           <a:p>
             <a:pPr marL="342900" indent="-342900">

</xml_diff>